<commit_message>
Add images and update presentation
</commit_message>
<xml_diff>
--- a/Presentation/Project-KDDM1.pptx
+++ b/Presentation/Project-KDDM1.pptx
@@ -293,7 +293,7 @@
           <a:p>
             <a:fld id="{250C9E9C-1806-3D45-8625-F0002340C4C2}" type="slidenum">
               <a:rPr lang="de-DE" smtClean="0"/>
-              <a:t>‹Nr.›</a:t>
+              <a:t>‹#›</a:t>
             </a:fld>
             <a:endParaRPr lang="de-DE"/>
           </a:p>
@@ -552,7 +552,7 @@
           <a:p>
             <a:fld id="{5DACABA8-235B-9747-A3D2-12573A6AFA9D}" type="slidenum">
               <a:rPr lang="de-DE" smtClean="0"/>
-              <a:t>‹Nr.›</a:t>
+              <a:t>‹#›</a:t>
             </a:fld>
             <a:endParaRPr lang="de-DE"/>
           </a:p>
@@ -1650,14 +1650,14 @@
           </a:ln>
           <a:extLst>
             <a:ext uri="{909E8E84-426E-40dd-AFC4-6F175D3DCCD1}">
-              <a14:hiddenFill xmlns="" xmlns:a14="http://schemas.microsoft.com/office/drawing/2010/main">
+              <a14:hiddenFill xmlns:a14="http://schemas.microsoft.com/office/drawing/2010/main" xmlns="">
                 <a:solidFill>
                   <a:srgbClr val="FFFFFF"/>
                 </a:solidFill>
               </a14:hiddenFill>
             </a:ext>
             <a:ext uri="{91240B29-F687-4f45-9708-019B960494DF}">
-              <a14:hiddenLine xmlns="" xmlns:a14="http://schemas.microsoft.com/office/drawing/2010/main" w="9525">
+              <a14:hiddenLine xmlns:a14="http://schemas.microsoft.com/office/drawing/2010/main" xmlns="" w="9525">
                 <a:solidFill>
                   <a:srgbClr val="000000"/>
                 </a:solidFill>
@@ -2258,14 +2258,14 @@
           </a:ln>
           <a:extLst>
             <a:ext uri="{909E8E84-426E-40dd-AFC4-6F175D3DCCD1}">
-              <a14:hiddenFill xmlns="" xmlns:a14="http://schemas.microsoft.com/office/drawing/2010/main">
+              <a14:hiddenFill xmlns:a14="http://schemas.microsoft.com/office/drawing/2010/main" xmlns="">
                 <a:solidFill>
                   <a:srgbClr val="FFFFFF"/>
                 </a:solidFill>
               </a14:hiddenFill>
             </a:ext>
             <a:ext uri="{91240B29-F687-4f45-9708-019B960494DF}">
-              <a14:hiddenLine xmlns="" xmlns:a14="http://schemas.microsoft.com/office/drawing/2010/main" w="9525">
+              <a14:hiddenLine xmlns:a14="http://schemas.microsoft.com/office/drawing/2010/main" xmlns="" w="9525">
                 <a:solidFill>
                   <a:srgbClr val="000000"/>
                 </a:solidFill>
@@ -2762,14 +2762,14 @@
           </a:ln>
           <a:extLst>
             <a:ext uri="{909E8E84-426E-40dd-AFC4-6F175D3DCCD1}">
-              <a14:hiddenFill xmlns="" xmlns:a14="http://schemas.microsoft.com/office/drawing/2010/main">
+              <a14:hiddenFill xmlns:a14="http://schemas.microsoft.com/office/drawing/2010/main" xmlns="">
                 <a:solidFill>
                   <a:srgbClr val="FFFFFF"/>
                 </a:solidFill>
               </a14:hiddenFill>
             </a:ext>
             <a:ext uri="{91240B29-F687-4f45-9708-019B960494DF}">
-              <a14:hiddenLine xmlns="" xmlns:a14="http://schemas.microsoft.com/office/drawing/2010/main" w="9525">
+              <a14:hiddenLine xmlns:a14="http://schemas.microsoft.com/office/drawing/2010/main" xmlns="" w="9525">
                 <a:solidFill>
                   <a:srgbClr val="000000"/>
                 </a:solidFill>
@@ -3710,7 +3710,7 @@
             <a:fld id="{4B64EC4D-37E3-EF42-B9AB-6337577588CB}" type="slidenum">
               <a:rPr lang="de-DE" smtClean="0"/>
               <a:pPr/>
-              <a:t>‹Nr.›</a:t>
+              <a:t>‹#›</a:t>
             </a:fld>
             <a:endParaRPr lang="de-DE" dirty="0"/>
           </a:p>
@@ -3990,7 +3990,7 @@
             <a:fld id="{4B64EC4D-37E3-EF42-B9AB-6337577588CB}" type="slidenum">
               <a:rPr lang="de-DE" smtClean="0"/>
               <a:pPr/>
-              <a:t>‹Nr.›</a:t>
+              <a:t>‹#›</a:t>
             </a:fld>
             <a:endParaRPr lang="de-DE" dirty="0"/>
           </a:p>
@@ -4318,7 +4318,7 @@
             <a:fld id="{4B64EC4D-37E3-EF42-B9AB-6337577588CB}" type="slidenum">
               <a:rPr lang="de-DE" smtClean="0"/>
               <a:pPr/>
-              <a:t>‹Nr.›</a:t>
+              <a:t>‹#›</a:t>
             </a:fld>
             <a:endParaRPr lang="de-DE" dirty="0"/>
           </a:p>
@@ -4472,7 +4472,7 @@
             <a:fld id="{4B64EC4D-37E3-EF42-B9AB-6337577588CB}" type="slidenum">
               <a:rPr lang="de-DE" smtClean="0"/>
               <a:pPr/>
-              <a:t>‹Nr.›</a:t>
+              <a:t>‹#›</a:t>
             </a:fld>
             <a:endParaRPr lang="de-DE" dirty="0"/>
           </a:p>
@@ -4603,7 +4603,7 @@
             <a:fld id="{4B64EC4D-37E3-EF42-B9AB-6337577588CB}" type="slidenum">
               <a:rPr lang="de-DE" smtClean="0"/>
               <a:pPr/>
-              <a:t>‹Nr.›</a:t>
+              <a:t>‹#›</a:t>
             </a:fld>
             <a:endParaRPr lang="de-DE" dirty="0"/>
           </a:p>
@@ -4896,14 +4896,14 @@
           </a:ln>
           <a:extLst>
             <a:ext uri="{909E8E84-426E-40dd-AFC4-6F175D3DCCD1}">
-              <a14:hiddenFill xmlns="" xmlns:a14="http://schemas.microsoft.com/office/drawing/2010/main">
+              <a14:hiddenFill xmlns:a14="http://schemas.microsoft.com/office/drawing/2010/main" xmlns="">
                 <a:solidFill>
                   <a:srgbClr val="FFFFFF"/>
                 </a:solidFill>
               </a14:hiddenFill>
             </a:ext>
             <a:ext uri="{91240B29-F687-4f45-9708-019B960494DF}">
-              <a14:hiddenLine xmlns="" xmlns:a14="http://schemas.microsoft.com/office/drawing/2010/main" w="9525">
+              <a14:hiddenLine xmlns:a14="http://schemas.microsoft.com/office/drawing/2010/main" xmlns="" w="9525">
                 <a:solidFill>
                   <a:srgbClr val="000000"/>
                 </a:solidFill>
@@ -5153,14 +5153,14 @@
           </a:ln>
           <a:extLst>
             <a:ext uri="{909E8E84-426E-40dd-AFC4-6F175D3DCCD1}">
-              <a14:hiddenFill xmlns="" xmlns:a14="http://schemas.microsoft.com/office/drawing/2010/main">
+              <a14:hiddenFill xmlns:a14="http://schemas.microsoft.com/office/drawing/2010/main" xmlns="">
                 <a:solidFill>
                   <a:srgbClr val="FFFFFF"/>
                 </a:solidFill>
               </a14:hiddenFill>
             </a:ext>
             <a:ext uri="{91240B29-F687-4f45-9708-019B960494DF}">
-              <a14:hiddenLine xmlns="" xmlns:a14="http://schemas.microsoft.com/office/drawing/2010/main" w="9525">
+              <a14:hiddenLine xmlns:a14="http://schemas.microsoft.com/office/drawing/2010/main" xmlns="" w="9525">
                 <a:solidFill>
                   <a:srgbClr val="000000"/>
                 </a:solidFill>
@@ -5362,7 +5362,7 @@
             <a:fld id="{4B64EC4D-37E3-EF42-B9AB-6337577588CB}" type="slidenum">
               <a:rPr lang="de-DE" smtClean="0"/>
               <a:pPr/>
-              <a:t>‹Nr.›</a:t>
+              <a:t>‹#›</a:t>
             </a:fld>
             <a:endParaRPr lang="de-DE" dirty="0"/>
           </a:p>
@@ -5402,14 +5402,14 @@
           </a:ln>
           <a:extLst>
             <a:ext uri="{909E8E84-426E-40dd-AFC4-6F175D3DCCD1}">
-              <a14:hiddenFill xmlns="" xmlns:a14="http://schemas.microsoft.com/office/drawing/2010/main">
+              <a14:hiddenFill xmlns:a14="http://schemas.microsoft.com/office/drawing/2010/main" xmlns="">
                 <a:solidFill>
                   <a:srgbClr val="FFFFFF"/>
                 </a:solidFill>
               </a14:hiddenFill>
             </a:ext>
             <a:ext uri="{91240B29-F687-4f45-9708-019B960494DF}">
-              <a14:hiddenLine xmlns="" xmlns:a14="http://schemas.microsoft.com/office/drawing/2010/main" w="9525">
+              <a14:hiddenLine xmlns:a14="http://schemas.microsoft.com/office/drawing/2010/main" xmlns="" w="9525">
                 <a:solidFill>
                   <a:srgbClr val="000000"/>
                 </a:solidFill>
@@ -6283,12 +6283,205 @@
           </a:p>
         </p:txBody>
       </p:sp>
+      <p:sp>
+        <p:nvSpPr>
+          <p:cNvPr id="5" name="Date Placeholder 4">
+            <a:extLst>
+              <a:ext uri="{FF2B5EF4-FFF2-40B4-BE49-F238E27FC236}">
+                <a16:creationId xmlns:a16="http://schemas.microsoft.com/office/drawing/2014/main" id="{CFFFF903-AD78-3D88-796B-6043F0A06E8B}"/>
+              </a:ext>
+            </a:extLst>
+          </p:cNvPr>
+          <p:cNvSpPr>
+            <a:spLocks noGrp="1"/>
+          </p:cNvSpPr>
+          <p:nvPr>
+            <p:ph type="dt" sz="half" idx="10"/>
+          </p:nvPr>
+        </p:nvSpPr>
+        <p:spPr/>
+        <p:txBody>
+          <a:bodyPr/>
+          <a:lstStyle/>
+          <a:p>
+            <a:r>
+              <a:rPr lang="de-AT" dirty="0"/>
+              <a:t>24.06.2024</a:t>
+            </a:r>
+            <a:endParaRPr lang="de-DE" dirty="0"/>
+          </a:p>
+        </p:txBody>
+      </p:sp>
+      <p:sp>
+        <p:nvSpPr>
+          <p:cNvPr id="6" name="Footer Placeholder 5">
+            <a:extLst>
+              <a:ext uri="{FF2B5EF4-FFF2-40B4-BE49-F238E27FC236}">
+                <a16:creationId xmlns:a16="http://schemas.microsoft.com/office/drawing/2014/main" id="{B9B96C97-885B-BAED-F950-994EEF6DD559}"/>
+              </a:ext>
+            </a:extLst>
+          </p:cNvPr>
+          <p:cNvSpPr>
+            <a:spLocks noGrp="1"/>
+          </p:cNvSpPr>
+          <p:nvPr>
+            <p:ph type="ftr" sz="quarter" idx="11"/>
+          </p:nvPr>
+        </p:nvSpPr>
+        <p:spPr/>
+        <p:txBody>
+          <a:bodyPr/>
+          <a:lstStyle/>
+          <a:p>
+            <a:r>
+              <a:rPr lang="en-US" dirty="0">
+                <a:latin typeface="gg sans"/>
+              </a:rPr>
+              <a:t>House Price Prediction</a:t>
+            </a:r>
+            <a:endParaRPr lang="de-DE" dirty="0"/>
+          </a:p>
+        </p:txBody>
+      </p:sp>
+      <p:sp>
+        <p:nvSpPr>
+          <p:cNvPr id="7" name="Slide Number Placeholder 6">
+            <a:extLst>
+              <a:ext uri="{FF2B5EF4-FFF2-40B4-BE49-F238E27FC236}">
+                <a16:creationId xmlns:a16="http://schemas.microsoft.com/office/drawing/2014/main" id="{7680926D-E94A-929D-C2BA-E29E60A3C5CE}"/>
+              </a:ext>
+            </a:extLst>
+          </p:cNvPr>
+          <p:cNvSpPr>
+            <a:spLocks noGrp="1"/>
+          </p:cNvSpPr>
+          <p:nvPr>
+            <p:ph type="sldNum" sz="quarter" idx="12"/>
+          </p:nvPr>
+        </p:nvSpPr>
+        <p:spPr/>
+        <p:txBody>
+          <a:bodyPr/>
+          <a:lstStyle/>
+          <a:p>
+            <a:fld id="{4B64EC4D-37E3-EF42-B9AB-6337577588CB}" type="slidenum">
+              <a:rPr lang="de-DE" smtClean="0"/>
+              <a:pPr/>
+              <a:t>3</a:t>
+            </a:fld>
+            <a:endParaRPr lang="de-DE" dirty="0"/>
+          </a:p>
+        </p:txBody>
+      </p:sp>
+      <p:sp>
+        <p:nvSpPr>
+          <p:cNvPr id="8" name="Text Placeholder 7">
+            <a:extLst>
+              <a:ext uri="{FF2B5EF4-FFF2-40B4-BE49-F238E27FC236}">
+                <a16:creationId xmlns:a16="http://schemas.microsoft.com/office/drawing/2014/main" id="{F8E2E9C9-6353-DFC3-011D-0B30CAD5812D}"/>
+              </a:ext>
+            </a:extLst>
+          </p:cNvPr>
+          <p:cNvSpPr>
+            <a:spLocks noGrp="1"/>
+          </p:cNvSpPr>
+          <p:nvPr>
+            <p:ph type="body" sz="quarter" idx="13"/>
+          </p:nvPr>
+        </p:nvSpPr>
+        <p:spPr/>
+        <p:txBody>
+          <a:bodyPr/>
+          <a:lstStyle/>
+          <a:p>
+            <a:r>
+              <a:rPr lang="de-DE" sz="1800" dirty="0"/>
+              <a:t>Exploritory Data Analysis</a:t>
+            </a:r>
+          </a:p>
+        </p:txBody>
+      </p:sp>
+      <p:sp>
+        <p:nvSpPr>
+          <p:cNvPr id="4" name="Content Placeholder 3">
+            <a:extLst>
+              <a:ext uri="{FF2B5EF4-FFF2-40B4-BE49-F238E27FC236}">
+                <a16:creationId xmlns:a16="http://schemas.microsoft.com/office/drawing/2014/main" id="{3F3A8CAF-00B9-2EBF-815C-5406B5EAFA8B}"/>
+              </a:ext>
+            </a:extLst>
+          </p:cNvPr>
+          <p:cNvSpPr>
+            <a:spLocks noGrp="1"/>
+          </p:cNvSpPr>
+          <p:nvPr>
+            <p:ph sz="half" idx="1"/>
+          </p:nvPr>
+        </p:nvSpPr>
+        <p:spPr/>
+        <p:txBody>
+          <a:bodyPr>
+            <a:normAutofit lnSpcReduction="10000"/>
+          </a:bodyPr>
+          <a:lstStyle/>
+          <a:p>
+            <a:pPr marL="514350" indent="-514350">
+              <a:buFont typeface="+mj-lt"/>
+              <a:buAutoNum type="arabicPeriod"/>
+            </a:pPr>
+            <a:r>
+              <a:rPr lang="en-GB" dirty="0"/>
+              <a:t>Bring data into shape</a:t>
+            </a:r>
+          </a:p>
+          <a:p>
+            <a:pPr marL="919401" lvl="1" indent="-514350"/>
+            <a:r>
+              <a:rPr lang="en-GB" dirty="0"/>
+              <a:t>Drop completely empty rows or useless columns</a:t>
+            </a:r>
+          </a:p>
+          <a:p>
+            <a:pPr marL="919401" lvl="1" indent="-514350"/>
+            <a:r>
+              <a:rPr lang="en-GB" dirty="0"/>
+              <a:t>Convert categorical values into </a:t>
+            </a:r>
+            <a:r>
+              <a:rPr lang="en-GB" dirty="0" err="1"/>
+              <a:t>enums</a:t>
+            </a:r>
+            <a:endParaRPr lang="en-GB" dirty="0"/>
+          </a:p>
+          <a:p>
+            <a:pPr marL="919401" lvl="1" indent="-514350"/>
+            <a:r>
+              <a:rPr lang="en-GB" dirty="0"/>
+              <a:t>Convert numerical values to integers if possible</a:t>
+            </a:r>
+          </a:p>
+          <a:p>
+            <a:pPr marL="919401" lvl="1" indent="-514350"/>
+            <a:r>
+              <a:rPr lang="en-GB" dirty="0"/>
+              <a:t>Simplify redundant values</a:t>
+            </a:r>
+          </a:p>
+          <a:p>
+            <a:pPr marL="919401" lvl="1" indent="-514350"/>
+            <a:r>
+              <a:rPr lang="en-GB" dirty="0"/>
+              <a:t>Coerce some invalid values to null</a:t>
+            </a:r>
+            <a:endParaRPr lang="en-AT" dirty="0"/>
+          </a:p>
+        </p:txBody>
+      </p:sp>
       <p:pic>
         <p:nvPicPr>
-          <p:cNvPr id="10" name="Content Placeholder 9" descr="A line of colored lines&#10;&#10;Description automatically generated with medium confidence">
+          <p:cNvPr id="14" name="Content Placeholder 13" descr="A line of colored lines&#10;&#10;Description automatically generated with medium confidence">
             <a:extLst>
               <a:ext uri="{FF2B5EF4-FFF2-40B4-BE49-F238E27FC236}">
-                <a16:creationId xmlns:a16="http://schemas.microsoft.com/office/drawing/2014/main" id="{4E744E44-36AD-1D7A-AEA5-5F136DD112EF}"/>
+                <a16:creationId xmlns:a16="http://schemas.microsoft.com/office/drawing/2014/main" id="{4EE3B07F-3B4B-73B7-309C-5B531D3C55F4}"/>
               </a:ext>
             </a:extLst>
           </p:cNvPr>
@@ -6296,7 +6489,7 @@
             <a:picLocks noGrp="1" noChangeAspect="1"/>
           </p:cNvPicPr>
           <p:nvPr>
-            <p:ph sz="half" idx="1"/>
+            <p:ph sz="half" idx="2"/>
           </p:nvPr>
         </p:nvPicPr>
         <p:blipFill>
@@ -6307,158 +6500,11 @@
         </p:blipFill>
         <p:spPr>
           <a:xfrm>
-            <a:off x="881063" y="2814385"/>
-            <a:ext cx="5754687" cy="3316792"/>
+            <a:off x="7002463" y="2813928"/>
+            <a:ext cx="5756275" cy="3317707"/>
           </a:xfrm>
         </p:spPr>
       </p:pic>
-      <p:pic>
-        <p:nvPicPr>
-          <p:cNvPr id="12" name="Content Placeholder 11" descr="A grid with a green dot&#10;&#10;Description automatically generated">
-            <a:extLst>
-              <a:ext uri="{FF2B5EF4-FFF2-40B4-BE49-F238E27FC236}">
-                <a16:creationId xmlns:a16="http://schemas.microsoft.com/office/drawing/2014/main" id="{799AC98A-E818-8185-A453-9ADB5CA1F28B}"/>
-              </a:ext>
-            </a:extLst>
-          </p:cNvPr>
-          <p:cNvPicPr>
-            <a:picLocks noGrp="1" noChangeAspect="1"/>
-          </p:cNvPicPr>
-          <p:nvPr>
-            <p:ph sz="half" idx="2"/>
-          </p:nvPr>
-        </p:nvPicPr>
-        <p:blipFill>
-          <a:blip r:embed="rId4"/>
-          <a:stretch>
-            <a:fillRect/>
-          </a:stretch>
-        </p:blipFill>
-        <p:spPr>
-          <a:xfrm>
-            <a:off x="7002463" y="2777297"/>
-            <a:ext cx="5756275" cy="3390969"/>
-          </a:xfrm>
-        </p:spPr>
-      </p:pic>
-      <p:sp>
-        <p:nvSpPr>
-          <p:cNvPr id="5" name="Date Placeholder 4">
-            <a:extLst>
-              <a:ext uri="{FF2B5EF4-FFF2-40B4-BE49-F238E27FC236}">
-                <a16:creationId xmlns:a16="http://schemas.microsoft.com/office/drawing/2014/main" id="{CFFFF903-AD78-3D88-796B-6043F0A06E8B}"/>
-              </a:ext>
-            </a:extLst>
-          </p:cNvPr>
-          <p:cNvSpPr>
-            <a:spLocks noGrp="1"/>
-          </p:cNvSpPr>
-          <p:nvPr>
-            <p:ph type="dt" sz="half" idx="10"/>
-          </p:nvPr>
-        </p:nvSpPr>
-        <p:spPr/>
-        <p:txBody>
-          <a:bodyPr/>
-          <a:lstStyle/>
-          <a:p>
-            <a:r>
-              <a:rPr lang="de-AT" dirty="0"/>
-              <a:t>24.06.2024</a:t>
-            </a:r>
-            <a:endParaRPr lang="de-DE" dirty="0"/>
-          </a:p>
-        </p:txBody>
-      </p:sp>
-      <p:sp>
-        <p:nvSpPr>
-          <p:cNvPr id="6" name="Footer Placeholder 5">
-            <a:extLst>
-              <a:ext uri="{FF2B5EF4-FFF2-40B4-BE49-F238E27FC236}">
-                <a16:creationId xmlns:a16="http://schemas.microsoft.com/office/drawing/2014/main" id="{B9B96C97-885B-BAED-F950-994EEF6DD559}"/>
-              </a:ext>
-            </a:extLst>
-          </p:cNvPr>
-          <p:cNvSpPr>
-            <a:spLocks noGrp="1"/>
-          </p:cNvSpPr>
-          <p:nvPr>
-            <p:ph type="ftr" sz="quarter" idx="11"/>
-          </p:nvPr>
-        </p:nvSpPr>
-        <p:spPr/>
-        <p:txBody>
-          <a:bodyPr/>
-          <a:lstStyle/>
-          <a:p>
-            <a:r>
-              <a:rPr lang="en-US" dirty="0">
-                <a:latin typeface="gg sans"/>
-              </a:rPr>
-              <a:t>House Price Prediction</a:t>
-            </a:r>
-            <a:endParaRPr lang="de-DE" dirty="0"/>
-          </a:p>
-        </p:txBody>
-      </p:sp>
-      <p:sp>
-        <p:nvSpPr>
-          <p:cNvPr id="7" name="Slide Number Placeholder 6">
-            <a:extLst>
-              <a:ext uri="{FF2B5EF4-FFF2-40B4-BE49-F238E27FC236}">
-                <a16:creationId xmlns:a16="http://schemas.microsoft.com/office/drawing/2014/main" id="{7680926D-E94A-929D-C2BA-E29E60A3C5CE}"/>
-              </a:ext>
-            </a:extLst>
-          </p:cNvPr>
-          <p:cNvSpPr>
-            <a:spLocks noGrp="1"/>
-          </p:cNvSpPr>
-          <p:nvPr>
-            <p:ph type="sldNum" sz="quarter" idx="12"/>
-          </p:nvPr>
-        </p:nvSpPr>
-        <p:spPr/>
-        <p:txBody>
-          <a:bodyPr/>
-          <a:lstStyle/>
-          <a:p>
-            <a:fld id="{4B64EC4D-37E3-EF42-B9AB-6337577588CB}" type="slidenum">
-              <a:rPr lang="de-DE" smtClean="0"/>
-              <a:pPr/>
-              <a:t>3</a:t>
-            </a:fld>
-            <a:endParaRPr lang="de-DE" dirty="0"/>
-          </a:p>
-        </p:txBody>
-      </p:sp>
-      <p:sp>
-        <p:nvSpPr>
-          <p:cNvPr id="8" name="Text Placeholder 7">
-            <a:extLst>
-              <a:ext uri="{FF2B5EF4-FFF2-40B4-BE49-F238E27FC236}">
-                <a16:creationId xmlns:a16="http://schemas.microsoft.com/office/drawing/2014/main" id="{F8E2E9C9-6353-DFC3-011D-0B30CAD5812D}"/>
-              </a:ext>
-            </a:extLst>
-          </p:cNvPr>
-          <p:cNvSpPr>
-            <a:spLocks noGrp="1"/>
-          </p:cNvSpPr>
-          <p:nvPr>
-            <p:ph type="body" sz="quarter" idx="13"/>
-          </p:nvPr>
-        </p:nvSpPr>
-        <p:spPr/>
-        <p:txBody>
-          <a:bodyPr/>
-          <a:lstStyle/>
-          <a:p>
-            <a:r>
-              <a:rPr lang="de-DE" sz="1800" dirty="0"/>
-              <a:t>Exploritory Data Analysis</a:t>
-            </a:r>
-          </a:p>
-        </p:txBody>
-      </p:sp>
     </p:spTree>
     <p:extLst>
       <p:ext uri="{BB962C8B-B14F-4D97-AF65-F5344CB8AC3E}">
@@ -6520,81 +6566,6 @@
       </p:sp>
       <p:sp>
         <p:nvSpPr>
-          <p:cNvPr id="3" name="Content Placeholder 2">
-            <a:extLst>
-              <a:ext uri="{FF2B5EF4-FFF2-40B4-BE49-F238E27FC236}">
-                <a16:creationId xmlns:a16="http://schemas.microsoft.com/office/drawing/2014/main" id="{F5F952D7-141E-8573-367A-F491A8EC4D43}"/>
-              </a:ext>
-            </a:extLst>
-          </p:cNvPr>
-          <p:cNvSpPr>
-            <a:spLocks noGrp="1"/>
-          </p:cNvSpPr>
-          <p:nvPr>
-            <p:ph sz="half" idx="1"/>
-          </p:nvPr>
-        </p:nvSpPr>
-        <p:spPr/>
-        <p:txBody>
-          <a:bodyPr>
-            <a:normAutofit lnSpcReduction="10000"/>
-          </a:bodyPr>
-          <a:lstStyle/>
-          <a:p>
-            <a:pPr marL="514350" indent="-514350">
-              <a:buFont typeface="+mj-lt"/>
-              <a:buAutoNum type="arabicPeriod"/>
-            </a:pPr>
-            <a:r>
-              <a:rPr lang="en-GB" dirty="0"/>
-              <a:t>Bring data into shape</a:t>
-            </a:r>
-          </a:p>
-          <a:p>
-            <a:pPr marL="919401" lvl="1" indent="-514350"/>
-            <a:r>
-              <a:rPr lang="en-GB" dirty="0"/>
-              <a:t>Drop completely empty rows or useless columns</a:t>
-            </a:r>
-          </a:p>
-          <a:p>
-            <a:pPr marL="919401" lvl="1" indent="-514350"/>
-            <a:r>
-              <a:rPr lang="en-GB" dirty="0"/>
-              <a:t>Convert categorical values into </a:t>
-            </a:r>
-            <a:r>
-              <a:rPr lang="en-GB" dirty="0" err="1"/>
-              <a:t>enums</a:t>
-            </a:r>
-            <a:endParaRPr lang="en-GB" dirty="0"/>
-          </a:p>
-          <a:p>
-            <a:pPr marL="919401" lvl="1" indent="-514350"/>
-            <a:r>
-              <a:rPr lang="en-GB" dirty="0"/>
-              <a:t>Convert numerical values to integers if possible</a:t>
-            </a:r>
-          </a:p>
-          <a:p>
-            <a:pPr marL="919401" lvl="1" indent="-514350"/>
-            <a:r>
-              <a:rPr lang="en-GB" dirty="0"/>
-              <a:t>Simplify redundant values</a:t>
-            </a:r>
-          </a:p>
-          <a:p>
-            <a:pPr marL="919401" lvl="1" indent="-514350"/>
-            <a:r>
-              <a:rPr lang="en-GB" dirty="0"/>
-              <a:t>Coerce some invalid values to null</a:t>
-            </a:r>
-            <a:endParaRPr lang="en-AT" dirty="0"/>
-          </a:p>
-        </p:txBody>
-      </p:sp>
-      <p:sp>
-        <p:nvSpPr>
           <p:cNvPr id="4" name="Content Placeholder 3">
             <a:extLst>
               <a:ext uri="{FF2B5EF4-FFF2-40B4-BE49-F238E27FC236}">
@@ -6765,6 +6736,35 @@
           </a:p>
         </p:txBody>
       </p:sp>
+      <p:pic>
+        <p:nvPicPr>
+          <p:cNvPr id="12" name="Content Placeholder 11" descr="A grid with a green dot&#10;&#10;Description automatically generated">
+            <a:extLst>
+              <a:ext uri="{FF2B5EF4-FFF2-40B4-BE49-F238E27FC236}">
+                <a16:creationId xmlns:a16="http://schemas.microsoft.com/office/drawing/2014/main" id="{799AC98A-E818-8185-A453-9ADB5CA1F28B}"/>
+              </a:ext>
+            </a:extLst>
+          </p:cNvPr>
+          <p:cNvPicPr>
+            <a:picLocks noGrp="1" noChangeAspect="1"/>
+          </p:cNvPicPr>
+          <p:nvPr>
+            <p:ph sz="half" idx="1"/>
+          </p:nvPr>
+        </p:nvPicPr>
+        <p:blipFill>
+          <a:blip r:embed="rId3"/>
+          <a:stretch>
+            <a:fillRect/>
+          </a:stretch>
+        </p:blipFill>
+        <p:spPr>
+          <a:xfrm>
+            <a:off x="881063" y="2777765"/>
+            <a:ext cx="5754687" cy="3390033"/>
+          </a:xfrm>
+        </p:spPr>
+      </p:pic>
     </p:spTree>
     <p:extLst>
       <p:ext uri="{BB962C8B-B14F-4D97-AF65-F5344CB8AC3E}">

</xml_diff>